<commit_message>
added ae for dose
</commit_message>
<xml_diff>
--- a/vector_images/rl_setup.pptx
+++ b/vector_images/rl_setup.pptx
@@ -6,6 +6,7 @@
   </p:sldMasterIdLst>
   <p:sldIdLst>
     <p:sldId id="256" r:id="rId2"/>
+    <p:sldId id="257" r:id="rId3"/>
   </p:sldIdLst>
   <p:sldSz cx="12192000" cy="6858000"/>
   <p:notesSz cx="6858000" cy="9144000"/>
@@ -104,6 +105,11 @@
       </a:defRPr>
     </a:lvl9pPr>
   </p:defaultTextStyle>
+  <p:extLst>
+    <p:ext uri="{EFAFB233-063F-42B5-8137-9DF3F51BA10A}">
+      <p15:sldGuideLst xmlns:p15="http://schemas.microsoft.com/office/powerpoint/2012/main"/>
+    </p:ext>
+  </p:extLst>
 </p:presentation>
 </file>
 
@@ -6931,6 +6937,347 @@
 </p:sld>
 </file>
 
+<file path=ppt/slides/slide2.xml><?xml version="1.0" encoding="utf-8"?>
+<p:sld xmlns:a="http://schemas.openxmlformats.org/drawingml/2006/main" xmlns:r="http://schemas.openxmlformats.org/officeDocument/2006/relationships" xmlns:p="http://schemas.openxmlformats.org/presentationml/2006/main">
+  <p:cSld>
+    <p:spTree>
+      <p:nvGrpSpPr>
+        <p:cNvPr id="1" name=""/>
+        <p:cNvGrpSpPr/>
+        <p:nvPr/>
+      </p:nvGrpSpPr>
+      <p:grpSpPr>
+        <a:xfrm>
+          <a:off x="0" y="0"/>
+          <a:ext cx="0" cy="0"/>
+          <a:chOff x="0" y="0"/>
+          <a:chExt cx="0" cy="0"/>
+        </a:xfrm>
+      </p:grpSpPr>
+      <p:sp>
+        <p:nvSpPr>
+          <p:cNvPr id="2" name="Trapezoid 1">
+            <a:extLst>
+              <a:ext uri="{FF2B5EF4-FFF2-40B4-BE49-F238E27FC236}">
+                <a16:creationId xmlns:a16="http://schemas.microsoft.com/office/drawing/2014/main" id="{9B2C91C7-9565-D4F2-EBE3-0A57B8451F80}"/>
+              </a:ext>
+            </a:extLst>
+          </p:cNvPr>
+          <p:cNvSpPr/>
+          <p:nvPr/>
+        </p:nvSpPr>
+        <p:spPr>
+          <a:xfrm rot="10800000">
+            <a:off x="3624769" y="1272598"/>
+            <a:ext cx="4589024" cy="1668294"/>
+          </a:xfrm>
+          <a:prstGeom prst="trapezoid">
+            <a:avLst>
+              <a:gd name="adj" fmla="val 50656"/>
+            </a:avLst>
+          </a:prstGeom>
+        </p:spPr>
+        <p:style>
+          <a:lnRef idx="2">
+            <a:schemeClr val="accent6">
+              <a:shade val="15000"/>
+            </a:schemeClr>
+          </a:lnRef>
+          <a:fillRef idx="1">
+            <a:schemeClr val="accent6"/>
+          </a:fillRef>
+          <a:effectRef idx="0">
+            <a:schemeClr val="accent6"/>
+          </a:effectRef>
+          <a:fontRef idx="minor">
+            <a:schemeClr val="lt1"/>
+          </a:fontRef>
+        </p:style>
+        <p:txBody>
+          <a:bodyPr rtlCol="0" anchor="ctr"/>
+          <a:lstStyle/>
+          <a:p>
+            <a:pPr algn="ctr"/>
+            <a:endParaRPr lang="en-US"/>
+          </a:p>
+        </p:txBody>
+      </p:sp>
+      <p:sp>
+        <p:nvSpPr>
+          <p:cNvPr id="4" name="Rectangle: Rounded Corners 3">
+            <a:extLst>
+              <a:ext uri="{FF2B5EF4-FFF2-40B4-BE49-F238E27FC236}">
+                <a16:creationId xmlns:a16="http://schemas.microsoft.com/office/drawing/2014/main" id="{298A5C43-8682-F5BB-8540-3ACD70B2DE11}"/>
+              </a:ext>
+            </a:extLst>
+          </p:cNvPr>
+          <p:cNvSpPr/>
+          <p:nvPr/>
+        </p:nvSpPr>
+        <p:spPr>
+          <a:xfrm>
+            <a:off x="3624770" y="553257"/>
+            <a:ext cx="4589023" cy="505026"/>
+          </a:xfrm>
+          <a:prstGeom prst="roundRect">
+            <a:avLst/>
+          </a:prstGeom>
+        </p:spPr>
+        <p:style>
+          <a:lnRef idx="2">
+            <a:schemeClr val="accent1">
+              <a:shade val="15000"/>
+            </a:schemeClr>
+          </a:lnRef>
+          <a:fillRef idx="1">
+            <a:schemeClr val="accent1"/>
+          </a:fillRef>
+          <a:effectRef idx="0">
+            <a:schemeClr val="accent1"/>
+          </a:effectRef>
+          <a:fontRef idx="minor">
+            <a:schemeClr val="lt1"/>
+          </a:fontRef>
+        </p:style>
+        <p:txBody>
+          <a:bodyPr rtlCol="0" anchor="ctr"/>
+          <a:lstStyle/>
+          <a:p>
+            <a:pPr algn="ctr"/>
+            <a:r>
+              <a:rPr lang="en-US" dirty="0"/>
+              <a:t>Original dose</a:t>
+            </a:r>
+          </a:p>
+        </p:txBody>
+      </p:sp>
+      <p:sp>
+        <p:nvSpPr>
+          <p:cNvPr id="5" name="Rectangle: Rounded Corners 4">
+            <a:extLst>
+              <a:ext uri="{FF2B5EF4-FFF2-40B4-BE49-F238E27FC236}">
+                <a16:creationId xmlns:a16="http://schemas.microsoft.com/office/drawing/2014/main" id="{EC9037F8-F684-828B-5D1A-67CD8CAEC6AA}"/>
+              </a:ext>
+            </a:extLst>
+          </p:cNvPr>
+          <p:cNvSpPr/>
+          <p:nvPr/>
+        </p:nvSpPr>
+        <p:spPr>
+          <a:xfrm>
+            <a:off x="4615776" y="3155205"/>
+            <a:ext cx="2607011" cy="505026"/>
+          </a:xfrm>
+          <a:prstGeom prst="roundRect">
+            <a:avLst>
+              <a:gd name="adj" fmla="val 50000"/>
+            </a:avLst>
+          </a:prstGeom>
+          <a:solidFill>
+            <a:schemeClr val="bg1">
+              <a:lumMod val="50000"/>
+            </a:schemeClr>
+          </a:solidFill>
+          <a:ln>
+            <a:solidFill>
+              <a:schemeClr val="tx1">
+                <a:lumMod val="75000"/>
+                <a:lumOff val="25000"/>
+              </a:schemeClr>
+            </a:solidFill>
+          </a:ln>
+        </p:spPr>
+        <p:style>
+          <a:lnRef idx="2">
+            <a:schemeClr val="accent1">
+              <a:shade val="15000"/>
+            </a:schemeClr>
+          </a:lnRef>
+          <a:fillRef idx="1">
+            <a:schemeClr val="accent1"/>
+          </a:fillRef>
+          <a:effectRef idx="0">
+            <a:schemeClr val="accent1"/>
+          </a:effectRef>
+          <a:fontRef idx="minor">
+            <a:schemeClr val="lt1"/>
+          </a:fontRef>
+        </p:style>
+        <p:txBody>
+          <a:bodyPr rtlCol="0" anchor="ctr"/>
+          <a:lstStyle/>
+          <a:p>
+            <a:pPr algn="ctr"/>
+            <a:r>
+              <a:rPr lang="en-US" dirty="0"/>
+              <a:t>Latent representation</a:t>
+            </a:r>
+          </a:p>
+        </p:txBody>
+      </p:sp>
+      <p:sp>
+        <p:nvSpPr>
+          <p:cNvPr id="6" name="Trapezoid 5">
+            <a:extLst>
+              <a:ext uri="{FF2B5EF4-FFF2-40B4-BE49-F238E27FC236}">
+                <a16:creationId xmlns:a16="http://schemas.microsoft.com/office/drawing/2014/main" id="{98D9383B-8CB2-1C9E-65E0-F23EDB39F6F2}"/>
+              </a:ext>
+            </a:extLst>
+          </p:cNvPr>
+          <p:cNvSpPr/>
+          <p:nvPr/>
+        </p:nvSpPr>
+        <p:spPr>
+          <a:xfrm>
+            <a:off x="3624769" y="3874546"/>
+            <a:ext cx="4589024" cy="1668294"/>
+          </a:xfrm>
+          <a:prstGeom prst="trapezoid">
+            <a:avLst>
+              <a:gd name="adj" fmla="val 50656"/>
+            </a:avLst>
+          </a:prstGeom>
+        </p:spPr>
+        <p:style>
+          <a:lnRef idx="2">
+            <a:schemeClr val="accent2">
+              <a:shade val="15000"/>
+            </a:schemeClr>
+          </a:lnRef>
+          <a:fillRef idx="1">
+            <a:schemeClr val="accent2"/>
+          </a:fillRef>
+          <a:effectRef idx="0">
+            <a:schemeClr val="accent2"/>
+          </a:effectRef>
+          <a:fontRef idx="minor">
+            <a:schemeClr val="lt1"/>
+          </a:fontRef>
+        </p:style>
+        <p:txBody>
+          <a:bodyPr rtlCol="0" anchor="ctr"/>
+          <a:lstStyle/>
+          <a:p>
+            <a:pPr algn="ctr"/>
+            <a:endParaRPr lang="en-US"/>
+          </a:p>
+        </p:txBody>
+      </p:sp>
+      <p:sp>
+        <p:nvSpPr>
+          <p:cNvPr id="7" name="Rectangle: Rounded Corners 6">
+            <a:extLst>
+              <a:ext uri="{FF2B5EF4-FFF2-40B4-BE49-F238E27FC236}">
+                <a16:creationId xmlns:a16="http://schemas.microsoft.com/office/drawing/2014/main" id="{F2898F9C-BE40-6AF4-43B2-6D44A9ACF2D3}"/>
+              </a:ext>
+            </a:extLst>
+          </p:cNvPr>
+          <p:cNvSpPr/>
+          <p:nvPr/>
+        </p:nvSpPr>
+        <p:spPr>
+          <a:xfrm>
+            <a:off x="3624770" y="5757152"/>
+            <a:ext cx="4589023" cy="505026"/>
+          </a:xfrm>
+          <a:prstGeom prst="roundRect">
+            <a:avLst/>
+          </a:prstGeom>
+        </p:spPr>
+        <p:style>
+          <a:lnRef idx="2">
+            <a:schemeClr val="accent5">
+              <a:shade val="15000"/>
+            </a:schemeClr>
+          </a:lnRef>
+          <a:fillRef idx="1">
+            <a:schemeClr val="accent5"/>
+          </a:fillRef>
+          <a:effectRef idx="0">
+            <a:schemeClr val="accent5"/>
+          </a:effectRef>
+          <a:fontRef idx="minor">
+            <a:schemeClr val="lt1"/>
+          </a:fontRef>
+        </p:style>
+        <p:txBody>
+          <a:bodyPr rtlCol="0" anchor="ctr"/>
+          <a:lstStyle/>
+          <a:p>
+            <a:pPr algn="ctr"/>
+            <a:r>
+              <a:rPr lang="en-US" dirty="0"/>
+              <a:t>Reconstructed dose</a:t>
+            </a:r>
+          </a:p>
+        </p:txBody>
+      </p:sp>
+      <p:sp>
+        <p:nvSpPr>
+          <p:cNvPr id="9" name="Rectangle 8">
+            <a:extLst>
+              <a:ext uri="{FF2B5EF4-FFF2-40B4-BE49-F238E27FC236}">
+                <a16:creationId xmlns:a16="http://schemas.microsoft.com/office/drawing/2014/main" id="{437E95D7-F840-A39F-1432-66B0E27966F5}"/>
+              </a:ext>
+            </a:extLst>
+          </p:cNvPr>
+          <p:cNvSpPr/>
+          <p:nvPr/>
+        </p:nvSpPr>
+        <p:spPr>
+          <a:xfrm>
+            <a:off x="3375498" y="398834"/>
+            <a:ext cx="5087566" cy="3375498"/>
+          </a:xfrm>
+          <a:prstGeom prst="rect">
+            <a:avLst/>
+          </a:prstGeom>
+          <a:noFill/>
+          <a:ln w="76200">
+            <a:solidFill>
+              <a:srgbClr val="C00000"/>
+            </a:solidFill>
+            <a:prstDash val="dash"/>
+          </a:ln>
+        </p:spPr>
+        <p:style>
+          <a:lnRef idx="2">
+            <a:schemeClr val="accent1">
+              <a:shade val="15000"/>
+            </a:schemeClr>
+          </a:lnRef>
+          <a:fillRef idx="1">
+            <a:schemeClr val="accent1"/>
+          </a:fillRef>
+          <a:effectRef idx="0">
+            <a:schemeClr val="accent1"/>
+          </a:effectRef>
+          <a:fontRef idx="minor">
+            <a:schemeClr val="lt1"/>
+          </a:fontRef>
+        </p:style>
+        <p:txBody>
+          <a:bodyPr rtlCol="0" anchor="ctr"/>
+          <a:lstStyle/>
+          <a:p>
+            <a:pPr algn="ctr"/>
+            <a:endParaRPr lang="en-US"/>
+          </a:p>
+        </p:txBody>
+      </p:sp>
+    </p:spTree>
+    <p:extLst>
+      <p:ext uri="{BB962C8B-B14F-4D97-AF65-F5344CB8AC3E}">
+        <p14:creationId xmlns:p14="http://schemas.microsoft.com/office/powerpoint/2010/main" val="3694073330"/>
+      </p:ext>
+    </p:extLst>
+  </p:cSld>
+  <p:clrMapOvr>
+    <a:masterClrMapping/>
+  </p:clrMapOvr>
+</p:sld>
+</file>
+
 <file path=ppt/theme/theme1.xml><?xml version="1.0" encoding="utf-8"?>
 <a:theme xmlns:a="http://schemas.openxmlformats.org/drawingml/2006/main" name="Office Theme">
   <a:themeElements>

</xml_diff>